<commit_message>
Demix Process Improvements #10
Update list (All presentation, and Plans)
1) pptxCover B26 changed CMMI Institute to ISACA, B30 changed SCAMPI to CMMI® Benchmark.
2) Updated Slide master to ISACA 2022.
3) Changed CN colour to #1F497D.
4) Added CN to Performance report, Ratings, and Team signature page.
5) Updated flags with India (Alphabetically)
6) Updated CMMI Dev logo
7) Changed "Chinese name" to "Indigenous name" and updated pptx. links.
8) Changed CN 'weakness "弱点" to "弱项".
9) Added and optional Agenda slide at the back for those who wants to use it.
</commit_message>
<xml_diff>
--- a/2021-04-12to04-16 (A5) C53517 SoftMARS/21_10v01_MarsBaseAlpha_PreliminaryFindings.pptx
+++ b/2021-04-12to04-16 (A5) C53517 SoftMARS/21_10v01_MarsBaseAlpha_PreliminaryFindings.pptx
@@ -12,8 +12,8 @@
   </p:handoutMasterIdLst>
   <p:sldIdLst>
     <p:sldId id="256" r:id="rId5"/>
-    <p:sldId id="1540" r:id="rId6"/>
-    <p:sldId id="1541" r:id="rId7"/>
+    <p:sldId id="1547" r:id="rId6"/>
+    <p:sldId id="1546" r:id="rId7"/>
     <p:sldId id="493" r:id="rId8"/>
     <p:sldId id="1545" r:id="rId9"/>
     <p:sldId id="439" r:id="rId10"/>
@@ -21,7 +21,7 @@
     <p:sldId id="1026" r:id="rId12"/>
     <p:sldId id="1543" r:id="rId13"/>
     <p:sldId id="926" r:id="rId14"/>
-    <p:sldId id="1544" r:id="rId15"/>
+    <p:sldId id="1548" r:id="rId15"/>
     <p:sldId id="887" r:id="rId16"/>
     <p:sldId id="888" r:id="rId17"/>
     <p:sldId id="889" r:id="rId18"/>
@@ -271,7 +271,7 @@
           <a:p>
             <a:fld id="{F319E496-E8FF-4856-B08F-DBE14D18B236}" type="datetimeFigureOut">
               <a:rPr lang="en-US" smtClean="0"/>
-              <a:t>8/6/2021</a:t>
+              <a:t>1/5/2022</a:t>
             </a:fld>
             <a:endParaRPr lang="en-US"/>
           </a:p>
@@ -448,7 +448,7 @@
           <a:p>
             <a:fld id="{4572F63B-EF0F-9942-98B2-F67CC88AF236}" type="datetimeFigureOut">
               <a:rPr lang="en-US" smtClean="0"/>
-              <a:t>8/6/2021</a:t>
+              <a:t>1/5/2022</a:t>
             </a:fld>
             <a:endParaRPr lang="en-US"/>
           </a:p>
@@ -786,13 +786,8 @@
             </a:pPr>
             <a:r>
               <a:rPr lang="en-ZA" altLang="zh-CN" dirty="0"/>
-              <a:t>Introduction. Also an opportunity to talk a bit about </a:t>
-            </a:r>
-            <a:r>
-              <a:rPr lang="en-ZA" altLang="zh-CN" dirty="0" err="1"/>
-              <a:t>Demix</a:t>
-            </a:r>
-            <a:endParaRPr lang="en-ZA" altLang="zh-CN" dirty="0"/>
+              <a:t>Introduction. Also an opportunity to talk a bit about Demix</a:t>
+            </a:r>
           </a:p>
           <a:p>
             <a:pPr marL="171450" marR="0" indent="-171450" algn="l" defTabSz="914400" rtl="0" eaLnBrk="0" fontAlgn="base" latinLnBrk="0" hangingPunct="0">
@@ -813,20 +808,8 @@
               <a:defRPr/>
             </a:pPr>
             <a:r>
-              <a:rPr lang="en-ZA" altLang="zh-CN" dirty="0" err="1"/>
-              <a:t>Demix</a:t>
-            </a:r>
-            <a:r>
               <a:rPr lang="en-ZA" altLang="zh-CN" dirty="0"/>
-              <a:t> has </a:t>
-            </a:r>
-            <a:r>
-              <a:rPr lang="en-ZA" altLang="zh-CN" dirty="0" err="1"/>
-              <a:t>LAs</a:t>
-            </a:r>
-            <a:r>
-              <a:rPr lang="en-ZA" altLang="zh-CN" dirty="0"/>
-              <a:t> from across the globe and performs appraisals around the world</a:t>
+              <a:t>Demix has LAs from across the globe and performs appraisals around the world</a:t>
             </a:r>
           </a:p>
           <a:p>
@@ -848,16 +831,8 @@
               <a:defRPr/>
             </a:pPr>
             <a:r>
-              <a:rPr lang="en-ZA" altLang="zh-CN" dirty="0" err="1"/>
-              <a:t>Demix</a:t>
-            </a:r>
-            <a:r>
               <a:rPr lang="en-ZA" altLang="zh-CN" dirty="0"/>
-              <a:t> is one of the largest CMMI services </a:t>
-            </a:r>
-            <a:r>
-              <a:rPr lang="en-ZA" altLang="zh-CN"/>
-              <a:t>providers globally</a:t>
+              <a:t>Demix is one of the largest CMMI services providers globally</a:t>
             </a:r>
           </a:p>
           <a:p>
@@ -879,12 +854,8 @@
               <a:defRPr/>
             </a:pPr>
             <a:r>
-              <a:rPr lang="en-ZA" altLang="zh-CN"/>
-              <a:t>Demix</a:t>
-            </a:r>
-            <a:r>
               <a:rPr lang="en-ZA" altLang="zh-CN" dirty="0"/>
-              <a:t> also provide other citification services, such as ISO, COBIT, MAX</a:t>
+              <a:t>Demix also provide other citification services, such as ISO, COBIT, MAX</a:t>
             </a:r>
           </a:p>
           <a:p>
@@ -1033,16 +1004,16 @@
           <a:lstStyle/>
           <a:p>
             <a:r>
-              <a:rPr lang="en-US"/>
+              <a:rPr lang="en-US" dirty="0"/>
               <a:t>Information in this section should come from the appraisal plan. The idea here is not to duplicate the contents of the plan, but to provide a summary for the Appraisal Sponsor, and the personnel from the OU who will see these findings.</a:t>
             </a:r>
           </a:p>
           <a:p>
-            <a:endParaRPr lang="en-US"/>
-          </a:p>
-          <a:p>
-            <a:r>
-              <a:rPr lang="en-US"/>
+            <a:endParaRPr lang="en-US" dirty="0"/>
+          </a:p>
+          <a:p>
+            <a:r>
+              <a:rPr lang="en-US" dirty="0"/>
               <a:t>The ATL may add additional information to the final findings presentation, but this minimum content must be present.</a:t>
             </a:r>
           </a:p>
@@ -1067,7 +1038,7 @@
               <a:rPr lang="en-US" smtClean="0"/>
               <a:t>3</a:t>
             </a:fld>
-            <a:endParaRPr lang="en-US"/>
+            <a:endParaRPr lang="en-US" dirty="0"/>
           </a:p>
         </p:txBody>
       </p:sp>
@@ -1854,7 +1825,7 @@
               </a14:hiddenLine>
             </a:ext>
             <a:ext uri="{FAA26D3D-D897-4be2-8F04-BA451C77F1D7}">
-              <ma14:placeholderFlag xmlns="" xmlns:ma14="http://schemas.microsoft.com/office/mac/drawingml/2011/main" val="1"/>
+              <ma14:placeholderFlag xmlns:ma14="http://schemas.microsoft.com/office/mac/drawingml/2011/main" xmlns="" val="1"/>
             </a:ext>
           </a:extLst>
         </p:spPr>
@@ -4473,7 +4444,7 @@
                 <a:ea typeface="+mn-ea"/>
                 <a:cs typeface="+mn-cs"/>
               </a:rPr>
-              <a:t>© ISACA 2021. All Rights Reserved.​</a:t>
+              <a:t>© ISACA 2022. All Rights Reserved.​</a:t>
             </a:r>
             <a:r>
               <a:rPr lang="en-US" dirty="0"/>
@@ -4632,14 +4603,14 @@
           </a:ln>
           <a:extLst>
             <a:ext uri="{909E8E84-426E-40dd-AFC4-6F175D3DCCD1}">
-              <a14:hiddenFill xmlns:a14="http://schemas.microsoft.com/office/drawing/2010/main" xmlns="">
+              <a14:hiddenFill xmlns="" xmlns:a14="http://schemas.microsoft.com/office/drawing/2010/main">
                 <a:solidFill>
                   <a:schemeClr val="accent1"/>
                 </a:solidFill>
               </a14:hiddenFill>
             </a:ext>
             <a:ext uri="{91240B29-F687-4f45-9708-019B960494DF}">
-              <a14:hiddenLine xmlns:a14="http://schemas.microsoft.com/office/drawing/2010/main" xmlns="" w="9525">
+              <a14:hiddenLine xmlns="" xmlns:a14="http://schemas.microsoft.com/office/drawing/2010/main" w="9525">
                 <a:solidFill>
                   <a:schemeClr val="tx1"/>
                 </a:solidFill>
@@ -5136,12 +5107,12 @@
           <a:graphicData uri="http://schemas.openxmlformats.org/presentationml/2006/ole">
             <mc:AlternateContent xmlns:mc="http://schemas.openxmlformats.org/markup-compatibility/2006">
               <mc:Choice xmlns:v="urn:schemas-microsoft-com:vml" Requires="v">
-                <p:oleObj name="Macro-Enabled Worksheet" r:id="rId2" imgW="5057763" imgH="2971715" progId="Excel.SheetMacroEnabled.12">
+                <p:oleObj spid="_x0000_s2053" name="Macro-Enabled Worksheet" r:id="rId3" imgW="5057763" imgH="2971715" progId="Excel.SheetMacroEnabled.12">
                   <p:link updateAutomatic="1"/>
                 </p:oleObj>
               </mc:Choice>
               <mc:Fallback>
-                <p:oleObj name="Macro-Enabled Worksheet" r:id="rId2" imgW="5057763" imgH="2971715" progId="Excel.SheetMacroEnabled.12">
+                <p:oleObj name="Macro-Enabled Worksheet" r:id="rId3" imgW="5057763" imgH="2971715" progId="Excel.SheetMacroEnabled.12">
                   <p:link updateAutomatic="1"/>
                   <p:pic>
                     <p:nvPicPr>
@@ -5156,7 +5127,7 @@
                       <p:nvPr/>
                     </p:nvPicPr>
                     <p:blipFill>
-                      <a:blip r:embed="rId3"/>
+                      <a:blip r:embed="rId4"/>
                       <a:stretch>
                         <a:fillRect/>
                       </a:stretch>
@@ -5205,12 +5176,12 @@
           <a:graphicData uri="http://schemas.openxmlformats.org/presentationml/2006/ole">
             <mc:AlternateContent xmlns:mc="http://schemas.openxmlformats.org/markup-compatibility/2006">
               <mc:Choice xmlns:v="urn:schemas-microsoft-com:vml" Requires="v">
-                <p:oleObj name="Macro-Enabled Worksheet" r:id="rId4" imgW="5057763" imgH="676332" progId="Excel.SheetMacroEnabled.12">
+                <p:oleObj spid="_x0000_s2054" name="Macro-Enabled Worksheet" r:id="rId5" imgW="5057763" imgH="676332" progId="Excel.SheetMacroEnabled.12">
                   <p:link updateAutomatic="1"/>
                 </p:oleObj>
               </mc:Choice>
               <mc:Fallback>
-                <p:oleObj name="Macro-Enabled Worksheet" r:id="rId4" imgW="5057763" imgH="676332" progId="Excel.SheetMacroEnabled.12">
+                <p:oleObj name="Macro-Enabled Worksheet" r:id="rId5" imgW="5057763" imgH="676332" progId="Excel.SheetMacroEnabled.12">
                   <p:link updateAutomatic="1"/>
                   <p:pic>
                     <p:nvPicPr>
@@ -5225,7 +5196,7 @@
                       <p:nvPr/>
                     </p:nvPicPr>
                     <p:blipFill>
-                      <a:blip r:embed="rId5"/>
+                      <a:blip r:embed="rId6"/>
                       <a:stretch>
                         <a:fillRect/>
                       </a:stretch>
@@ -5274,12 +5245,12 @@
           <a:graphicData uri="http://schemas.openxmlformats.org/presentationml/2006/ole">
             <mc:AlternateContent xmlns:mc="http://schemas.openxmlformats.org/markup-compatibility/2006">
               <mc:Choice xmlns:v="urn:schemas-microsoft-com:vml" Requires="v">
-                <p:oleObj name="Macro-Enabled Worksheet" r:id="rId6" imgW="5057763" imgH="276367" progId="Excel.SheetMacroEnabled.12">
+                <p:oleObj spid="_x0000_s2055" name="Macro-Enabled Worksheet" r:id="rId7" imgW="5057763" imgH="276367" progId="Excel.SheetMacroEnabled.12">
                   <p:link updateAutomatic="1"/>
                 </p:oleObj>
               </mc:Choice>
               <mc:Fallback>
-                <p:oleObj name="Macro-Enabled Worksheet" r:id="rId6" imgW="5057763" imgH="276367" progId="Excel.SheetMacroEnabled.12">
+                <p:oleObj name="Macro-Enabled Worksheet" r:id="rId7" imgW="5057763" imgH="276367" progId="Excel.SheetMacroEnabled.12">
                   <p:link updateAutomatic="1"/>
                   <p:pic>
                     <p:nvPicPr>
@@ -5294,7 +5265,7 @@
                       <p:nvPr/>
                     </p:nvPicPr>
                     <p:blipFill>
-                      <a:blip r:embed="rId7"/>
+                      <a:blip r:embed="rId8"/>
                       <a:stretch>
                         <a:fillRect/>
                       </a:stretch>
@@ -5650,11 +5621,17 @@
             </a:br>
             <a:r>
               <a:rPr lang="zh-CN" altLang="en-US" sz="6000" b="1" dirty="0">
+                <a:solidFill>
+                  <a:srgbClr val="1F497D"/>
+                </a:solidFill>
                 <a:latin typeface="+mn-lt"/>
               </a:rPr>
               <a:t>实践域发现</a:t>
             </a:r>
             <a:endParaRPr lang="en-US" b="1" dirty="0">
+              <a:solidFill>
+                <a:srgbClr val="1F497D"/>
+              </a:solidFill>
               <a:latin typeface="+mn-lt"/>
             </a:endParaRPr>
           </a:p>
@@ -5663,7 +5640,7 @@
     </p:spTree>
     <p:extLst>
       <p:ext uri="{BB962C8B-B14F-4D97-AF65-F5344CB8AC3E}">
-        <p14:creationId xmlns:p14="http://schemas.microsoft.com/office/powerpoint/2010/main" val="1701387909"/>
+        <p14:creationId xmlns:p14="http://schemas.microsoft.com/office/powerpoint/2010/main" val="1002676547"/>
       </p:ext>
     </p:extLst>
   </p:cSld>
@@ -5858,6 +5835,8 @@
                 <a:solidFill>
                   <a:srgbClr val="1F497D"/>
                 </a:solidFill>
+                <a:latin typeface="DengXian" panose="02010600030101010101" pitchFamily="2" charset="-122"/>
+                <a:ea typeface="DengXian" panose="02010600030101010101" pitchFamily="2" charset="-122"/>
               </a:rPr>
               <a:t>强项</a:t>
             </a:r>
@@ -5881,6 +5860,8 @@
                 <a:solidFill>
                   <a:srgbClr val="1F497D"/>
                 </a:solidFill>
+                <a:latin typeface="DengXian" panose="02010600030101010101" pitchFamily="2" charset="-122"/>
+                <a:ea typeface="DengXian" panose="02010600030101010101" pitchFamily="2" charset="-122"/>
               </a:rPr>
               <a:t>没有</a:t>
             </a:r>
@@ -5888,6 +5869,8 @@
               <a:solidFill>
                 <a:srgbClr val="1F497D"/>
               </a:solidFill>
+              <a:latin typeface="DengXian" panose="02010600030101010101" pitchFamily="2" charset="-122"/>
+              <a:ea typeface="DengXian" panose="02010600030101010101" pitchFamily="2" charset="-122"/>
             </a:endParaRPr>
           </a:p>
           <a:p>
@@ -5902,12 +5885,14 @@
               <a:t>Weaknesses </a:t>
             </a:r>
             <a:r>
-              <a:rPr lang="ja-JP" altLang="en-US" sz="1800" b="1" dirty="0">
-                <a:solidFill>
-                  <a:srgbClr val="1F497D"/>
-                </a:solidFill>
-              </a:rPr>
-              <a:t>弱点</a:t>
+              <a:rPr lang="zh-CN" altLang="en-US" sz="1800" dirty="0">
+                <a:solidFill>
+                  <a:srgbClr val="1F497D"/>
+                </a:solidFill>
+                <a:latin typeface="DengXian" panose="02010600030101010101" pitchFamily="2" charset="-122"/>
+                <a:ea typeface="DengXian" panose="02010600030101010101" pitchFamily="2" charset="-122"/>
+              </a:rPr>
+              <a:t>弱项</a:t>
             </a:r>
             <a:r>
               <a:rPr lang="en-US" altLang="ja-JP" sz="1800" b="1" dirty="0"/>
@@ -6223,6 +6208,8 @@
                 <a:solidFill>
                   <a:srgbClr val="1F497D"/>
                 </a:solidFill>
+                <a:latin typeface="DengXian" panose="02010600030101010101" pitchFamily="2" charset="-122"/>
+                <a:ea typeface="DengXian" panose="02010600030101010101" pitchFamily="2" charset="-122"/>
               </a:rPr>
               <a:t>强项</a:t>
             </a:r>
@@ -6310,12 +6297,14 @@
               <a:t>Weaknesses </a:t>
             </a:r>
             <a:r>
-              <a:rPr lang="ja-JP" altLang="en-US" sz="1800" b="1" dirty="0">
-                <a:solidFill>
-                  <a:srgbClr val="1F497D"/>
-                </a:solidFill>
-              </a:rPr>
-              <a:t>弱点</a:t>
+              <a:rPr lang="zh-CN" altLang="en-US" sz="1800" dirty="0">
+                <a:solidFill>
+                  <a:srgbClr val="1F497D"/>
+                </a:solidFill>
+                <a:latin typeface="DengXian" panose="02010600030101010101" pitchFamily="2" charset="-122"/>
+                <a:ea typeface="DengXian" panose="02010600030101010101" pitchFamily="2" charset="-122"/>
+              </a:rPr>
+              <a:t>弱项</a:t>
             </a:r>
             <a:r>
               <a:rPr lang="en-US" altLang="ja-JP" sz="1800" b="1" dirty="0"/>
@@ -6584,13 +6573,15 @@
             </a:pPr>
             <a:r>
               <a:rPr lang="en-US" sz="1800" b="1" dirty="0"/>
-              <a:t>Strengths</a:t>
+              <a:t>Strengths </a:t>
             </a:r>
             <a:r>
               <a:rPr lang="ja-JP" altLang="en-US" sz="1800" b="1" dirty="0">
                 <a:solidFill>
                   <a:srgbClr val="1F497D"/>
                 </a:solidFill>
+                <a:latin typeface="DengXian" panose="02010600030101010101" pitchFamily="2" charset="-122"/>
+                <a:ea typeface="DengXian" panose="02010600030101010101" pitchFamily="2" charset="-122"/>
               </a:rPr>
               <a:t>强项</a:t>
             </a:r>
@@ -6669,15 +6660,17 @@
             </a:pPr>
             <a:r>
               <a:rPr lang="en-US" sz="1800" b="1" dirty="0"/>
-              <a:t>Weaknesses</a:t>
-            </a:r>
-            <a:r>
-              <a:rPr lang="ja-JP" altLang="en-US" sz="1800" b="1" dirty="0">
-                <a:solidFill>
-                  <a:srgbClr val="1F497D"/>
-                </a:solidFill>
-              </a:rPr>
-              <a:t>弱点</a:t>
+              <a:t>Weaknesses </a:t>
+            </a:r>
+            <a:r>
+              <a:rPr lang="zh-CN" altLang="en-US" sz="1800" dirty="0">
+                <a:solidFill>
+                  <a:srgbClr val="1F497D"/>
+                </a:solidFill>
+                <a:latin typeface="DengXian" panose="02010600030101010101" pitchFamily="2" charset="-122"/>
+                <a:ea typeface="DengXian" panose="02010600030101010101" pitchFamily="2" charset="-122"/>
+              </a:rPr>
+              <a:t>弱项</a:t>
             </a:r>
             <a:r>
               <a:rPr lang="en-US" altLang="ja-JP" sz="1800" b="1" dirty="0"/>
@@ -6936,13 +6929,15 @@
             </a:pPr>
             <a:r>
               <a:rPr lang="en-US" sz="1800" b="1" dirty="0"/>
-              <a:t>Strengths</a:t>
+              <a:t>Strengths </a:t>
             </a:r>
             <a:r>
               <a:rPr lang="ja-JP" altLang="en-US" sz="1800" b="1" dirty="0">
                 <a:solidFill>
                   <a:srgbClr val="1F497D"/>
                 </a:solidFill>
+                <a:latin typeface="DengXian" panose="02010600030101010101" pitchFamily="2" charset="-122"/>
+                <a:ea typeface="DengXian" panose="02010600030101010101" pitchFamily="2" charset="-122"/>
               </a:rPr>
               <a:t>强项</a:t>
             </a:r>
@@ -7019,15 +7014,17 @@
             </a:pPr>
             <a:r>
               <a:rPr lang="en-US" sz="1800" b="1" dirty="0"/>
-              <a:t>Weaknesses</a:t>
-            </a:r>
-            <a:r>
-              <a:rPr lang="ja-JP" altLang="en-US" sz="1800" b="1" dirty="0">
-                <a:solidFill>
-                  <a:srgbClr val="1F497D"/>
-                </a:solidFill>
-              </a:rPr>
-              <a:t>弱点</a:t>
+              <a:t>Weaknesses </a:t>
+            </a:r>
+            <a:r>
+              <a:rPr lang="zh-CN" altLang="en-US" sz="1800" dirty="0">
+                <a:solidFill>
+                  <a:srgbClr val="1F497D"/>
+                </a:solidFill>
+                <a:latin typeface="DengXian" panose="02010600030101010101" pitchFamily="2" charset="-122"/>
+                <a:ea typeface="DengXian" panose="02010600030101010101" pitchFamily="2" charset="-122"/>
+              </a:rPr>
+              <a:t>弱项</a:t>
             </a:r>
             <a:r>
               <a:rPr lang="en-US" altLang="ja-JP" sz="1800" b="1" dirty="0"/>
@@ -7295,20 +7292,25 @@
           </a:bodyPr>
           <a:lstStyle/>
           <a:p>
-            <a:r>
-              <a:rPr lang="en-US" sz="2000" dirty="0"/>
-              <a:t>Strengths</a:t>
-            </a:r>
-            <a:r>
-              <a:rPr lang="ja-JP" altLang="en-US" sz="2000" dirty="0">
-                <a:solidFill>
-                  <a:srgbClr val="1F497D"/>
-                </a:solidFill>
+            <a:pPr marL="0" indent="0">
+              <a:buNone/>
+            </a:pPr>
+            <a:r>
+              <a:rPr lang="en-US" sz="2000" b="1" dirty="0"/>
+              <a:t>Strengths </a:t>
+            </a:r>
+            <a:r>
+              <a:rPr lang="ja-JP" altLang="en-US" sz="2000" b="1" dirty="0">
+                <a:solidFill>
+                  <a:srgbClr val="1F497D"/>
+                </a:solidFill>
+                <a:latin typeface="DengXian" panose="02010600030101010101" pitchFamily="2" charset="-122"/>
+                <a:ea typeface="DengXian" panose="02010600030101010101" pitchFamily="2" charset="-122"/>
               </a:rPr>
               <a:t>强项</a:t>
             </a:r>
             <a:r>
-              <a:rPr lang="en-US" altLang="ja-JP" sz="2000" dirty="0"/>
+              <a:rPr lang="en-US" altLang="ja-JP" sz="2000" b="1" dirty="0"/>
               <a:t>:</a:t>
             </a:r>
             <a:endParaRPr lang="en-US" sz="2000" dirty="0"/>
@@ -7340,20 +7342,25 @@
             <a:endParaRPr lang="en-US" sz="2000" dirty="0"/>
           </a:p>
           <a:p>
-            <a:r>
-              <a:rPr lang="en-US" sz="2000" dirty="0"/>
-              <a:t>Weaknesses</a:t>
-            </a:r>
-            <a:r>
-              <a:rPr lang="ja-JP" altLang="en-US" sz="2000" dirty="0">
-                <a:solidFill>
-                  <a:srgbClr val="1F497D"/>
-                </a:solidFill>
-              </a:rPr>
-              <a:t>弱点</a:t>
-            </a:r>
-            <a:r>
-              <a:rPr lang="en-US" altLang="ja-JP" sz="2000" dirty="0"/>
+            <a:pPr marL="0" indent="0">
+              <a:buNone/>
+            </a:pPr>
+            <a:r>
+              <a:rPr lang="en-US" sz="2000" b="1" dirty="0"/>
+              <a:t>Weaknesses </a:t>
+            </a:r>
+            <a:r>
+              <a:rPr lang="zh-CN" altLang="en-US" sz="2000" dirty="0">
+                <a:solidFill>
+                  <a:srgbClr val="1F497D"/>
+                </a:solidFill>
+                <a:latin typeface="DengXian" panose="02010600030101010101" pitchFamily="2" charset="-122"/>
+                <a:ea typeface="DengXian" panose="02010600030101010101" pitchFamily="2" charset="-122"/>
+              </a:rPr>
+              <a:t>弱项</a:t>
+            </a:r>
+            <a:r>
+              <a:rPr lang="en-US" altLang="ja-JP" sz="2000" b="1" dirty="0"/>
               <a:t>:</a:t>
             </a:r>
             <a:endParaRPr lang="en-US" sz="2000" dirty="0"/>
@@ -7472,23 +7479,28 @@
           </a:bodyPr>
           <a:lstStyle/>
           <a:p>
-            <a:r>
-              <a:rPr lang="en-US" dirty="0"/>
-              <a:t>Strengths</a:t>
-            </a:r>
-            <a:r>
-              <a:rPr lang="ja-JP" altLang="en-US" dirty="0">
-                <a:solidFill>
-                  <a:srgbClr val="1F497D"/>
-                </a:solidFill>
+            <a:pPr marL="0" indent="0">
+              <a:buNone/>
+            </a:pPr>
+            <a:r>
+              <a:rPr lang="en-US" sz="2400" b="1" dirty="0"/>
+              <a:t>Strengths </a:t>
+            </a:r>
+            <a:r>
+              <a:rPr lang="ja-JP" altLang="en-US" sz="2400" b="1" dirty="0">
+                <a:solidFill>
+                  <a:srgbClr val="1F497D"/>
+                </a:solidFill>
+                <a:latin typeface="DengXian" panose="02010600030101010101" pitchFamily="2" charset="-122"/>
+                <a:ea typeface="DengXian" panose="02010600030101010101" pitchFamily="2" charset="-122"/>
               </a:rPr>
               <a:t>强项</a:t>
             </a:r>
             <a:r>
-              <a:rPr lang="en-US" altLang="ja-JP" dirty="0"/>
+              <a:rPr lang="en-US" altLang="ja-JP" sz="2400" b="1" dirty="0"/>
               <a:t>:</a:t>
             </a:r>
-            <a:endParaRPr lang="en-US" dirty="0"/>
+            <a:endParaRPr lang="en-US" sz="2400" dirty="0"/>
           </a:p>
           <a:p>
             <a:pPr marL="342900" indent="-342900">
@@ -7525,20 +7537,25 @@
             </a:endParaRPr>
           </a:p>
           <a:p>
-            <a:r>
-              <a:rPr lang="en-US" sz="2000" dirty="0"/>
-              <a:t>Weaknesses</a:t>
-            </a:r>
-            <a:r>
-              <a:rPr lang="ja-JP" altLang="en-US" sz="2000" dirty="0">
-                <a:solidFill>
-                  <a:srgbClr val="1F497D"/>
-                </a:solidFill>
-              </a:rPr>
-              <a:t>弱点</a:t>
-            </a:r>
-            <a:r>
-              <a:rPr lang="en-US" altLang="ja-JP" sz="2000" dirty="0"/>
+            <a:pPr marL="0" indent="0">
+              <a:buNone/>
+            </a:pPr>
+            <a:r>
+              <a:rPr lang="en-US" sz="2000" b="1" dirty="0"/>
+              <a:t>Weaknesses </a:t>
+            </a:r>
+            <a:r>
+              <a:rPr lang="zh-CN" altLang="en-US" sz="2000" dirty="0">
+                <a:solidFill>
+                  <a:srgbClr val="1F497D"/>
+                </a:solidFill>
+                <a:latin typeface="DengXian" panose="02010600030101010101" pitchFamily="2" charset="-122"/>
+                <a:ea typeface="DengXian" panose="02010600030101010101" pitchFamily="2" charset="-122"/>
+              </a:rPr>
+              <a:t>弱项</a:t>
+            </a:r>
+            <a:r>
+              <a:rPr lang="en-US" altLang="ja-JP" sz="2000" b="1" dirty="0"/>
               <a:t>:</a:t>
             </a:r>
             <a:endParaRPr lang="en-US" sz="2000" dirty="0"/>
@@ -8033,23 +8050,28 @@
           </a:bodyPr>
           <a:lstStyle/>
           <a:p>
-            <a:r>
-              <a:rPr lang="en-US" dirty="0"/>
-              <a:t>Strengths</a:t>
-            </a:r>
-            <a:r>
-              <a:rPr lang="ja-JP" altLang="en-US" dirty="0">
-                <a:solidFill>
-                  <a:srgbClr val="1F497D"/>
-                </a:solidFill>
+            <a:pPr marL="0" indent="0">
+              <a:buNone/>
+            </a:pPr>
+            <a:r>
+              <a:rPr lang="en-US" sz="2400" b="1" dirty="0"/>
+              <a:t>Strengths </a:t>
+            </a:r>
+            <a:r>
+              <a:rPr lang="ja-JP" altLang="en-US" sz="2400" b="1" dirty="0">
+                <a:solidFill>
+                  <a:srgbClr val="1F497D"/>
+                </a:solidFill>
+                <a:latin typeface="DengXian" panose="02010600030101010101" pitchFamily="2" charset="-122"/>
+                <a:ea typeface="DengXian" panose="02010600030101010101" pitchFamily="2" charset="-122"/>
               </a:rPr>
               <a:t>强项</a:t>
             </a:r>
             <a:r>
-              <a:rPr lang="en-US" altLang="ja-JP" dirty="0"/>
+              <a:rPr lang="en-US" altLang="ja-JP" sz="2400" b="1" dirty="0"/>
               <a:t>:</a:t>
             </a:r>
-            <a:endParaRPr lang="en-US" dirty="0"/>
+            <a:endParaRPr lang="en-US" sz="2400" dirty="0"/>
           </a:p>
           <a:p>
             <a:pPr marL="342900" indent="-342900">
@@ -8403,12 +8425,6 @@
               </a:rPr>
               <a:t>将管理和改进工作集中在成本、进度和质量性能上，最大限度地提高业务投资回报。</a:t>
             </a:r>
-          </a:p>
-          <a:p>
-            <a:endParaRPr lang="en-US" sz="1800" dirty="0"/>
-          </a:p>
-          <a:p>
-            <a:endParaRPr lang="en-US" sz="1800" dirty="0"/>
           </a:p>
         </p:txBody>
       </p:sp>
@@ -8477,11 +8493,28 @@
             <a:endParaRPr lang="en-ZA" altLang="ja-JP" sz="2000" b="0" dirty="0"/>
           </a:p>
           <a:p>
-            <a:r>
-              <a:rPr lang="en-US" dirty="0"/>
-              <a:t>Weaknesses</a:t>
-            </a:r>
-            <a:endParaRPr lang="en-ZA" dirty="0"/>
+            <a:pPr marL="0" indent="0">
+              <a:buNone/>
+            </a:pPr>
+            <a:r>
+              <a:rPr lang="en-US" sz="2400" b="1" dirty="0"/>
+              <a:t>Weaknesses </a:t>
+            </a:r>
+            <a:r>
+              <a:rPr lang="zh-CN" altLang="en-US" sz="2400" dirty="0">
+                <a:solidFill>
+                  <a:srgbClr val="1F497D"/>
+                </a:solidFill>
+                <a:latin typeface="DengXian" panose="02010600030101010101" pitchFamily="2" charset="-122"/>
+                <a:ea typeface="DengXian" panose="02010600030101010101" pitchFamily="2" charset="-122"/>
+              </a:rPr>
+              <a:t>弱项</a:t>
+            </a:r>
+            <a:r>
+              <a:rPr lang="en-US" altLang="ja-JP" sz="2400" b="1" dirty="0"/>
+              <a:t>:</a:t>
+            </a:r>
+            <a:endParaRPr lang="en-US" sz="2400" dirty="0"/>
           </a:p>
           <a:p>
             <a:pPr marL="342900" indent="-342900">
@@ -8953,7 +8986,7 @@
         </p:nvSpPr>
         <p:spPr bwMode="auto">
           <a:xfrm>
-            <a:off x="683050" y="1666284"/>
+            <a:off x="756500" y="1613732"/>
             <a:ext cx="10825900" cy="4524315"/>
           </a:xfrm>
           <a:prstGeom prst="rect">
@@ -9099,7 +9132,7 @@
             <a:r>
               <a:rPr lang="en-ZA" altLang="zh-CN" sz="1600" b="1" dirty="0">
                 <a:solidFill>
-                  <a:srgbClr val="0070C0"/>
+                  <a:srgbClr val="1F497D"/>
                 </a:solidFill>
                 <a:latin typeface="+mn-lt"/>
               </a:rPr>
@@ -9245,16 +9278,10 @@
               <a:t>模型执行概要中所描述的，</a:t>
             </a:r>
             <a:r>
-              <a:rPr lang="en-ZA" sz="1600" dirty="0" err="1">
-                <a:latin typeface="+mn-lt"/>
-              </a:rPr>
-              <a:t>CMMI（Capability</a:t>
-            </a:r>
-            <a:r>
               <a:rPr lang="en-ZA" sz="1600" dirty="0">
                 <a:latin typeface="+mn-lt"/>
               </a:rPr>
-              <a:t> Maturity Model Integration）</a:t>
+              <a:t>CMMI（Capability Maturity Model Integration）</a:t>
             </a:r>
             <a:r>
               <a:rPr lang="zh-CN" altLang="en-US" sz="1600" dirty="0">
@@ -9367,108 +9394,81 @@
           </a:p>
           <a:p>
             <a:r>
-              <a:rPr lang="en-ZA" altLang="zh-CN" sz="1600" u="sng" dirty="0">
-                <a:solidFill>
-                  <a:srgbClr val="0070C0"/>
+              <a:rPr lang="en-ZA" altLang="zh-CN" sz="1600" b="1" dirty="0">
+                <a:solidFill>
+                  <a:srgbClr val="1F497D"/>
                 </a:solidFill>
                 <a:latin typeface="+mn-lt"/>
               </a:rPr>
-              <a:t>Note</a:t>
-            </a:r>
-            <a:r>
-              <a:rPr lang="en-ZA" altLang="zh-CN" sz="1600" dirty="0">
-                <a:solidFill>
-                  <a:srgbClr val="0070C0"/>
+              <a:t>Note:</a:t>
+            </a:r>
+            <a:r>
+              <a:rPr lang="zh-CN" altLang="en-US" sz="1600" b="1" dirty="0">
+                <a:solidFill>
+                  <a:srgbClr val="1F497D"/>
                 </a:solidFill>
                 <a:latin typeface="+mn-lt"/>
               </a:rPr>
-              <a:t>:</a:t>
-            </a:r>
-            <a:r>
-              <a:rPr lang="zh-CN" altLang="en-US" sz="1600" dirty="0">
-                <a:solidFill>
-                  <a:srgbClr val="0070C0"/>
-                </a:solidFill>
-                <a:latin typeface="+mn-lt"/>
-              </a:rPr>
               <a:t>注：</a:t>
             </a:r>
-            <a:endParaRPr lang="en-ZA" altLang="zh-CN" sz="1600" dirty="0">
+            <a:endParaRPr lang="en-ZA" altLang="zh-CN" sz="1600" b="1" dirty="0">
               <a:solidFill>
-                <a:srgbClr val="0070C0"/>
+                <a:srgbClr val="1F497D"/>
               </a:solidFill>
               <a:latin typeface="+mn-lt"/>
             </a:endParaRPr>
           </a:p>
           <a:p>
             <a:r>
-              <a:rPr lang="en-ZA" altLang="zh-CN" sz="1600" dirty="0">
-                <a:solidFill>
-                  <a:srgbClr val="0070C0"/>
+              <a:rPr lang="en-ZA" altLang="zh-CN" sz="1600" b="1" dirty="0">
+                <a:solidFill>
+                  <a:srgbClr val="1F497D"/>
                 </a:solidFill>
                 <a:latin typeface="+mn-lt"/>
               </a:rPr>
-              <a:t>With the above as background, refence to </a:t>
-            </a:r>
-            <a:r>
-              <a:rPr lang="en-ZA" altLang="zh-CN" sz="1600" b="1" dirty="0">
-                <a:solidFill>
-                  <a:srgbClr val="0070C0"/>
+              <a:t>With the above as background, refence to CMMI is now only used in relation to the model and its use, and not as an organization anymore. </a:t>
+            </a:r>
+          </a:p>
+          <a:p>
+            <a:r>
+              <a:rPr lang="zh-CN" altLang="en-US" sz="1600" b="1" dirty="0">
+                <a:solidFill>
+                  <a:srgbClr val="1F497D"/>
                 </a:solidFill>
                 <a:latin typeface="+mn-lt"/>
               </a:rPr>
-              <a:t>CMMI is now only used in relation to the model </a:t>
-            </a:r>
-            <a:r>
-              <a:rPr lang="en-ZA" altLang="zh-CN" sz="1600" dirty="0">
-                <a:solidFill>
-                  <a:srgbClr val="0070C0"/>
+              <a:t>在上述背景下，现在对于</a:t>
+            </a:r>
+            <a:r>
+              <a:rPr lang="en-US" altLang="zh-CN" sz="1600" b="1" dirty="0">
+                <a:solidFill>
+                  <a:srgbClr val="1F497D"/>
                 </a:solidFill>
                 <a:latin typeface="+mn-lt"/>
               </a:rPr>
-              <a:t>and its use, and not as an organization anymore. </a:t>
-            </a:r>
-          </a:p>
-          <a:p>
-            <a:r>
-              <a:rPr lang="zh-CN" altLang="en-US" sz="1600" dirty="0">
-                <a:solidFill>
-                  <a:srgbClr val="0070C0"/>
+              <a:t>CMMI</a:t>
+            </a:r>
+            <a:r>
+              <a:rPr lang="zh-CN" altLang="en-US" sz="1600" b="1" dirty="0">
+                <a:solidFill>
+                  <a:srgbClr val="1F497D"/>
                 </a:solidFill>
                 <a:latin typeface="+mn-lt"/>
               </a:rPr>
-              <a:t>在上述背景下，现在对于</a:t>
-            </a:r>
-            <a:r>
-              <a:rPr lang="en-US" altLang="zh-CN" sz="1600" dirty="0">
-                <a:solidFill>
-                  <a:srgbClr val="0070C0"/>
-                </a:solidFill>
-                <a:latin typeface="+mn-lt"/>
-              </a:rPr>
-              <a:t>CMMI</a:t>
-            </a:r>
-            <a:r>
-              <a:rPr lang="zh-CN" altLang="en-US" sz="1600" dirty="0">
-                <a:solidFill>
-                  <a:srgbClr val="0070C0"/>
-                </a:solidFill>
-                <a:latin typeface="+mn-lt"/>
-              </a:rPr>
               <a:t>的引用只涉及模型本身及其使用，而不再视之为一个组织。</a:t>
             </a:r>
-            <a:endParaRPr lang="en-ZA" altLang="zh-CN" sz="1600" dirty="0">
+            <a:endParaRPr lang="en-ZA" altLang="zh-CN" sz="1600" b="1" dirty="0">
               <a:solidFill>
-                <a:srgbClr val="0070C0"/>
+                <a:srgbClr val="1F497D"/>
               </a:solidFill>
               <a:latin typeface="+mn-lt"/>
             </a:endParaRPr>
           </a:p>
           <a:p>
             <a:r>
-              <a:rPr lang="en-ZA" sz="1600" b="0" i="0" u="none" strike="noStrike" baseline="0" dirty="0">
-                <a:solidFill>
-                  <a:srgbClr val="0070C0"/>
+              <a:rPr lang="en-ZA" sz="1600" b="1" dirty="0">
+                <a:solidFill>
+                  <a:srgbClr val="1F497D"/>
                 </a:solidFill>
                 <a:latin typeface="+mn-lt"/>
               </a:rPr>
@@ -9477,44 +9477,44 @@
           </a:p>
           <a:p>
             <a:r>
-              <a:rPr lang="en-US" altLang="zh-CN" sz="1600" dirty="0">
-                <a:solidFill>
-                  <a:srgbClr val="0070C0"/>
+              <a:rPr lang="en-US" altLang="zh-CN" sz="1600" b="1" dirty="0">
+                <a:solidFill>
+                  <a:srgbClr val="1F497D"/>
                 </a:solidFill>
                 <a:latin typeface="+mn-lt"/>
               </a:rPr>
               <a:t>ISACA</a:t>
             </a:r>
             <a:r>
-              <a:rPr lang="zh-CN" altLang="en-US" sz="1600" dirty="0">
-                <a:solidFill>
-                  <a:srgbClr val="0070C0"/>
+              <a:rPr lang="zh-CN" altLang="en-US" sz="1600" b="1" dirty="0">
+                <a:solidFill>
+                  <a:srgbClr val="1F497D"/>
                 </a:solidFill>
                 <a:latin typeface="+mn-lt"/>
               </a:rPr>
               <a:t>拥有</a:t>
             </a:r>
             <a:r>
-              <a:rPr lang="en-US" altLang="zh-CN" sz="1600" dirty="0">
-                <a:solidFill>
-                  <a:srgbClr val="0070C0"/>
+              <a:rPr lang="en-US" altLang="zh-CN" sz="1600" b="1" dirty="0">
+                <a:solidFill>
+                  <a:srgbClr val="1F497D"/>
                 </a:solidFill>
                 <a:latin typeface="+mn-lt"/>
               </a:rPr>
               <a:t>CMMI</a:t>
             </a:r>
             <a:r>
-              <a:rPr lang="zh-CN" altLang="en-US" sz="1600" dirty="0">
-                <a:solidFill>
-                  <a:srgbClr val="0070C0"/>
+              <a:rPr lang="zh-CN" altLang="en-US" sz="1600" b="1" dirty="0">
+                <a:solidFill>
+                  <a:srgbClr val="1F497D"/>
                 </a:solidFill>
                 <a:latin typeface="+mn-lt"/>
               </a:rPr>
               <a:t>的内容的所有版权、商标及所有其他知识产权。</a:t>
             </a:r>
-            <a:endParaRPr lang="en-ZA" altLang="zh-CN" sz="1600" dirty="0">
+            <a:endParaRPr lang="en-ZA" altLang="zh-CN" sz="1600" b="1" dirty="0">
               <a:solidFill>
-                <a:srgbClr val="0070C0"/>
+                <a:srgbClr val="1F497D"/>
               </a:solidFill>
               <a:latin typeface="+mn-lt"/>
             </a:endParaRPr>
@@ -9666,7 +9666,7 @@
     </p:spTree>
     <p:extLst>
       <p:ext uri="{BB962C8B-B14F-4D97-AF65-F5344CB8AC3E}">
-        <p14:creationId xmlns:p14="http://schemas.microsoft.com/office/powerpoint/2010/main" val="1200733486"/>
+        <p14:creationId xmlns:p14="http://schemas.microsoft.com/office/powerpoint/2010/main" val="3513404221"/>
       </p:ext>
     </p:extLst>
   </p:cSld>
@@ -9845,20 +9845,25 @@
           </a:bodyPr>
           <a:lstStyle/>
           <a:p>
-            <a:r>
-              <a:rPr lang="en-US" sz="1800" dirty="0"/>
-              <a:t>Strengths</a:t>
-            </a:r>
-            <a:r>
-              <a:rPr lang="ja-JP" altLang="en-US" sz="1800" dirty="0">
-                <a:solidFill>
-                  <a:srgbClr val="1F497D"/>
-                </a:solidFill>
+            <a:pPr marL="0" indent="0">
+              <a:buNone/>
+            </a:pPr>
+            <a:r>
+              <a:rPr lang="en-US" sz="1800" b="1" dirty="0"/>
+              <a:t>Strengths </a:t>
+            </a:r>
+            <a:r>
+              <a:rPr lang="ja-JP" altLang="en-US" sz="1800" b="1" dirty="0">
+                <a:solidFill>
+                  <a:srgbClr val="1F497D"/>
+                </a:solidFill>
+                <a:latin typeface="DengXian" panose="02010600030101010101" pitchFamily="2" charset="-122"/>
+                <a:ea typeface="DengXian" panose="02010600030101010101" pitchFamily="2" charset="-122"/>
               </a:rPr>
               <a:t>强项</a:t>
             </a:r>
             <a:r>
-              <a:rPr lang="en-US" altLang="ja-JP" sz="1800" dirty="0"/>
+              <a:rPr lang="en-US" altLang="ja-JP" sz="1800" b="1" dirty="0"/>
               <a:t>:</a:t>
             </a:r>
             <a:endParaRPr lang="en-US" sz="1800" dirty="0"/>
@@ -9901,20 +9906,25 @@
             </a:endParaRPr>
           </a:p>
           <a:p>
-            <a:r>
-              <a:rPr lang="en-US" sz="1800" dirty="0"/>
-              <a:t>Weaknesses</a:t>
-            </a:r>
-            <a:r>
-              <a:rPr lang="ja-JP" altLang="en-US" sz="1800" dirty="0">
-                <a:solidFill>
-                  <a:srgbClr val="1F497D"/>
-                </a:solidFill>
-              </a:rPr>
-              <a:t>弱点</a:t>
-            </a:r>
-            <a:r>
-              <a:rPr lang="en-US" altLang="ja-JP" sz="1800" dirty="0"/>
+            <a:pPr marL="0" indent="0">
+              <a:buNone/>
+            </a:pPr>
+            <a:r>
+              <a:rPr lang="en-US" sz="1800" b="1" dirty="0"/>
+              <a:t>Weaknesses </a:t>
+            </a:r>
+            <a:r>
+              <a:rPr lang="zh-CN" altLang="en-US" sz="1800" dirty="0">
+                <a:solidFill>
+                  <a:srgbClr val="1F497D"/>
+                </a:solidFill>
+                <a:latin typeface="DengXian" panose="02010600030101010101" pitchFamily="2" charset="-122"/>
+                <a:ea typeface="DengXian" panose="02010600030101010101" pitchFamily="2" charset="-122"/>
+              </a:rPr>
+              <a:t>弱项</a:t>
+            </a:r>
+            <a:r>
+              <a:rPr lang="en-US" altLang="ja-JP" sz="1800" b="1" dirty="0"/>
               <a:t>:</a:t>
             </a:r>
             <a:endParaRPr lang="en-US" sz="1800" dirty="0"/>
@@ -10165,20 +10175,25 @@
           </a:bodyPr>
           <a:lstStyle/>
           <a:p>
-            <a:r>
-              <a:rPr lang="en-US" sz="1800" dirty="0"/>
-              <a:t>Strengths</a:t>
-            </a:r>
-            <a:r>
-              <a:rPr lang="ja-JP" altLang="en-US" sz="1800" dirty="0">
-                <a:solidFill>
-                  <a:srgbClr val="1F497D"/>
-                </a:solidFill>
+            <a:pPr marL="0" indent="0">
+              <a:buNone/>
+            </a:pPr>
+            <a:r>
+              <a:rPr lang="en-US" sz="1800" b="1" dirty="0"/>
+              <a:t>Strengths </a:t>
+            </a:r>
+            <a:r>
+              <a:rPr lang="ja-JP" altLang="en-US" sz="1800" b="1" dirty="0">
+                <a:solidFill>
+                  <a:srgbClr val="1F497D"/>
+                </a:solidFill>
+                <a:latin typeface="DengXian" panose="02010600030101010101" pitchFamily="2" charset="-122"/>
+                <a:ea typeface="DengXian" panose="02010600030101010101" pitchFamily="2" charset="-122"/>
               </a:rPr>
               <a:t>强项</a:t>
             </a:r>
             <a:r>
-              <a:rPr lang="en-US" altLang="ja-JP" sz="1800" dirty="0"/>
+              <a:rPr lang="en-US" altLang="ja-JP" sz="1800" b="1" dirty="0"/>
               <a:t>:</a:t>
             </a:r>
             <a:endParaRPr lang="en-US" sz="1800" dirty="0"/>
@@ -10255,20 +10270,25 @@
             </a:endParaRPr>
           </a:p>
           <a:p>
-            <a:r>
-              <a:rPr lang="en-US" sz="1800" dirty="0"/>
-              <a:t>Weaknesses</a:t>
-            </a:r>
-            <a:r>
-              <a:rPr lang="ja-JP" altLang="en-US" sz="1800" dirty="0">
-                <a:solidFill>
-                  <a:srgbClr val="1F497D"/>
-                </a:solidFill>
-              </a:rPr>
-              <a:t>弱点</a:t>
-            </a:r>
-            <a:r>
-              <a:rPr lang="en-US" altLang="ja-JP" sz="1800" dirty="0"/>
+            <a:pPr marL="0" indent="0">
+              <a:buNone/>
+            </a:pPr>
+            <a:r>
+              <a:rPr lang="en-US" sz="1800" b="1" dirty="0"/>
+              <a:t>Weaknesses </a:t>
+            </a:r>
+            <a:r>
+              <a:rPr lang="zh-CN" altLang="en-US" sz="1800" dirty="0">
+                <a:solidFill>
+                  <a:srgbClr val="1F497D"/>
+                </a:solidFill>
+                <a:latin typeface="DengXian" panose="02010600030101010101" pitchFamily="2" charset="-122"/>
+                <a:ea typeface="DengXian" panose="02010600030101010101" pitchFamily="2" charset="-122"/>
+              </a:rPr>
+              <a:t>弱项</a:t>
+            </a:r>
+            <a:r>
+              <a:rPr lang="en-US" altLang="ja-JP" sz="1800" b="1" dirty="0"/>
               <a:t>:</a:t>
             </a:r>
             <a:endParaRPr lang="en-US" sz="1800" dirty="0"/>
@@ -10438,20 +10458,25 @@
           </a:bodyPr>
           <a:lstStyle/>
           <a:p>
-            <a:r>
-              <a:rPr lang="en-US" sz="1800" dirty="0"/>
-              <a:t>Strengths</a:t>
-            </a:r>
-            <a:r>
-              <a:rPr lang="ja-JP" altLang="en-US" sz="1800" dirty="0">
-                <a:solidFill>
-                  <a:srgbClr val="1F497D"/>
-                </a:solidFill>
+            <a:pPr marL="0" indent="0">
+              <a:buNone/>
+            </a:pPr>
+            <a:r>
+              <a:rPr lang="en-US" sz="1800" b="1" dirty="0"/>
+              <a:t>Strengths </a:t>
+            </a:r>
+            <a:r>
+              <a:rPr lang="ja-JP" altLang="en-US" sz="1800" b="1" dirty="0">
+                <a:solidFill>
+                  <a:srgbClr val="1F497D"/>
+                </a:solidFill>
+                <a:latin typeface="DengXian" panose="02010600030101010101" pitchFamily="2" charset="-122"/>
+                <a:ea typeface="DengXian" panose="02010600030101010101" pitchFamily="2" charset="-122"/>
               </a:rPr>
               <a:t>强项</a:t>
             </a:r>
             <a:r>
-              <a:rPr lang="en-US" altLang="ja-JP" sz="1800" dirty="0"/>
+              <a:rPr lang="en-US" altLang="ja-JP" sz="1800" b="1" dirty="0"/>
               <a:t>:</a:t>
             </a:r>
             <a:endParaRPr lang="en-US" sz="1800" dirty="0"/>
@@ -10483,20 +10508,25 @@
             <a:endParaRPr lang="en-US" sz="1800" dirty="0"/>
           </a:p>
           <a:p>
-            <a:r>
-              <a:rPr lang="en-US" sz="1800" dirty="0"/>
-              <a:t>Weaknesses</a:t>
-            </a:r>
-            <a:r>
-              <a:rPr lang="ja-JP" altLang="en-US" sz="1800" dirty="0">
-                <a:solidFill>
-                  <a:srgbClr val="1F497D"/>
-                </a:solidFill>
-              </a:rPr>
-              <a:t>弱点</a:t>
-            </a:r>
-            <a:r>
-              <a:rPr lang="en-US" altLang="ja-JP" sz="1800" dirty="0"/>
+            <a:pPr marL="0" indent="0">
+              <a:buNone/>
+            </a:pPr>
+            <a:r>
+              <a:rPr lang="en-US" sz="1800" b="1" dirty="0"/>
+              <a:t>Weaknesses </a:t>
+            </a:r>
+            <a:r>
+              <a:rPr lang="zh-CN" altLang="en-US" sz="1800" dirty="0">
+                <a:solidFill>
+                  <a:srgbClr val="1F497D"/>
+                </a:solidFill>
+                <a:latin typeface="DengXian" panose="02010600030101010101" pitchFamily="2" charset="-122"/>
+                <a:ea typeface="DengXian" panose="02010600030101010101" pitchFamily="2" charset="-122"/>
+              </a:rPr>
+              <a:t>弱项</a:t>
+            </a:r>
+            <a:r>
+              <a:rPr lang="en-US" altLang="ja-JP" sz="1800" b="1" dirty="0"/>
               <a:t>:</a:t>
             </a:r>
             <a:endParaRPr lang="en-US" sz="1800" dirty="0"/>
@@ -10768,15 +10798,20 @@
           </a:bodyPr>
           <a:lstStyle/>
           <a:p>
+            <a:pPr marL="0" indent="0">
+              <a:buNone/>
+            </a:pPr>
             <a:r>
               <a:rPr lang="en-US" sz="1800" b="1" dirty="0"/>
-              <a:t>Strengths</a:t>
+              <a:t>Strengths </a:t>
             </a:r>
             <a:r>
               <a:rPr lang="ja-JP" altLang="en-US" sz="1800" b="1" dirty="0">
                 <a:solidFill>
                   <a:srgbClr val="1F497D"/>
                 </a:solidFill>
+                <a:latin typeface="DengXian" panose="02010600030101010101" pitchFamily="2" charset="-122"/>
+                <a:ea typeface="DengXian" panose="02010600030101010101" pitchFamily="2" charset="-122"/>
               </a:rPr>
               <a:t>强项</a:t>
             </a:r>
@@ -10813,17 +10848,22 @@
             <a:endParaRPr lang="en-US" sz="1800" dirty="0"/>
           </a:p>
           <a:p>
+            <a:pPr marL="0" indent="0">
+              <a:buNone/>
+            </a:pPr>
             <a:r>
               <a:rPr lang="en-US" sz="1800" b="1" dirty="0"/>
-              <a:t>Weaknesses</a:t>
-            </a:r>
-            <a:r>
-              <a:rPr lang="ja-JP" altLang="en-US" sz="1800" b="1" dirty="0">
-                <a:solidFill>
-                  <a:srgbClr val="1F497D"/>
-                </a:solidFill>
-              </a:rPr>
-              <a:t>弱点</a:t>
+              <a:t>Weaknesses </a:t>
+            </a:r>
+            <a:r>
+              <a:rPr lang="zh-CN" altLang="en-US" sz="1800" dirty="0">
+                <a:solidFill>
+                  <a:srgbClr val="1F497D"/>
+                </a:solidFill>
+                <a:latin typeface="DengXian" panose="02010600030101010101" pitchFamily="2" charset="-122"/>
+                <a:ea typeface="DengXian" panose="02010600030101010101" pitchFamily="2" charset="-122"/>
+              </a:rPr>
+              <a:t>弱项</a:t>
             </a:r>
             <a:r>
               <a:rPr lang="en-US" altLang="ja-JP" sz="1800" b="1" dirty="0"/>
@@ -11104,7 +11144,7 @@
         <p:spPr>
           <a:xfrm>
             <a:off x="466344" y="2968823"/>
-            <a:ext cx="11265408" cy="2599686"/>
+            <a:ext cx="11265408" cy="2977225"/>
           </a:xfrm>
           <a:prstGeom prst="rect">
             <a:avLst/>
@@ -11117,15 +11157,20 @@
           </a:bodyPr>
           <a:lstStyle/>
           <a:p>
+            <a:pPr marL="0" indent="0">
+              <a:buNone/>
+            </a:pPr>
             <a:r>
               <a:rPr lang="en-US" sz="1800" b="1" dirty="0"/>
-              <a:t>Strengths</a:t>
+              <a:t>Strengths </a:t>
             </a:r>
             <a:r>
               <a:rPr lang="ja-JP" altLang="en-US" sz="1800" b="1" dirty="0">
                 <a:solidFill>
                   <a:srgbClr val="1F497D"/>
                 </a:solidFill>
+                <a:latin typeface="DengXian" panose="02010600030101010101" pitchFamily="2" charset="-122"/>
+                <a:ea typeface="DengXian" panose="02010600030101010101" pitchFamily="2" charset="-122"/>
               </a:rPr>
               <a:t>强项</a:t>
             </a:r>
@@ -11181,6 +11226,17 @@
               </a:rPr>
               <a:t>工作环境标准已明确定义以供使用。</a:t>
             </a:r>
+            <a:endParaRPr lang="en-ZA" altLang="zh-CN" sz="1800" b="0" dirty="0">
+              <a:solidFill>
+                <a:srgbClr val="1F497D"/>
+              </a:solidFill>
+            </a:endParaRPr>
+          </a:p>
+          <a:p>
+            <a:pPr marL="342900" indent="-342900">
+              <a:buFont typeface="Arial" panose="020B0604020202020204" pitchFamily="34" charset="0"/>
+              <a:buChar char="•"/>
+            </a:pPr>
             <a:endParaRPr lang="en-US" sz="1800" b="0" dirty="0">
               <a:solidFill>
                 <a:srgbClr val="1F497D"/>
@@ -11188,17 +11244,22 @@
             </a:endParaRPr>
           </a:p>
           <a:p>
+            <a:pPr marL="0" indent="0">
+              <a:buNone/>
+            </a:pPr>
             <a:r>
               <a:rPr lang="en-US" sz="1800" b="1" dirty="0"/>
-              <a:t>Weaknesses</a:t>
-            </a:r>
-            <a:r>
-              <a:rPr lang="ja-JP" altLang="en-US" sz="1800" b="1" dirty="0">
-                <a:solidFill>
-                  <a:srgbClr val="1F497D"/>
-                </a:solidFill>
-              </a:rPr>
-              <a:t>弱点</a:t>
+              <a:t>Weaknesses </a:t>
+            </a:r>
+            <a:r>
+              <a:rPr lang="zh-CN" altLang="en-US" sz="1800" dirty="0">
+                <a:solidFill>
+                  <a:srgbClr val="1F497D"/>
+                </a:solidFill>
+                <a:latin typeface="DengXian" panose="02010600030101010101" pitchFamily="2" charset="-122"/>
+                <a:ea typeface="DengXian" panose="02010600030101010101" pitchFamily="2" charset="-122"/>
+              </a:rPr>
+              <a:t>弱项</a:t>
             </a:r>
             <a:r>
               <a:rPr lang="en-US" altLang="ja-JP" sz="1800" b="1" dirty="0"/>
@@ -11488,15 +11549,20 @@
             <a:endParaRPr lang="en-US" sz="1800" b="1" dirty="0"/>
           </a:p>
           <a:p>
+            <a:pPr marL="0" indent="0">
+              <a:buNone/>
+            </a:pPr>
             <a:r>
               <a:rPr lang="en-US" sz="1800" b="1" dirty="0"/>
-              <a:t>Strengths</a:t>
+              <a:t>Strengths </a:t>
             </a:r>
             <a:r>
               <a:rPr lang="ja-JP" altLang="en-US" sz="1800" b="1" dirty="0">
                 <a:solidFill>
                   <a:srgbClr val="1F497D"/>
                 </a:solidFill>
+                <a:latin typeface="DengXian" panose="02010600030101010101" pitchFamily="2" charset="-122"/>
+                <a:ea typeface="DengXian" panose="02010600030101010101" pitchFamily="2" charset="-122"/>
               </a:rPr>
               <a:t>强项</a:t>
             </a:r>
@@ -11504,7 +11570,7 @@
               <a:rPr lang="en-US" altLang="ja-JP" sz="1800" b="1" dirty="0"/>
               <a:t>:</a:t>
             </a:r>
-            <a:endParaRPr lang="en-US" sz="1800" b="1" dirty="0"/>
+            <a:endParaRPr lang="en-US" sz="1800" dirty="0"/>
           </a:p>
           <a:p>
             <a:pPr marL="342900" indent="-342900">
@@ -11841,23 +11907,28 @@
             <a:endParaRPr lang="en-US" sz="1800" b="1" dirty="0"/>
           </a:p>
           <a:p>
+            <a:pPr marL="0" indent="0">
+              <a:buNone/>
+            </a:pPr>
             <a:r>
               <a:rPr lang="en-US" sz="1800" b="1" dirty="0"/>
-              <a:t>Weaknesses</a:t>
-            </a:r>
-            <a:r>
-              <a:rPr lang="ja-JP" altLang="en-US" sz="1800" b="1" dirty="0">
-                <a:solidFill>
-                  <a:srgbClr val="1F497D"/>
-                </a:solidFill>
-              </a:rPr>
-              <a:t>弱点</a:t>
+              <a:t>Weaknesses </a:t>
+            </a:r>
+            <a:r>
+              <a:rPr lang="zh-CN" altLang="en-US" sz="1800" dirty="0">
+                <a:solidFill>
+                  <a:srgbClr val="1F497D"/>
+                </a:solidFill>
+                <a:latin typeface="DengXian" panose="02010600030101010101" pitchFamily="2" charset="-122"/>
+                <a:ea typeface="DengXian" panose="02010600030101010101" pitchFamily="2" charset="-122"/>
+              </a:rPr>
+              <a:t>弱项</a:t>
             </a:r>
             <a:r>
               <a:rPr lang="en-US" altLang="ja-JP" sz="1800" b="1" dirty="0"/>
               <a:t>:</a:t>
             </a:r>
-            <a:endParaRPr lang="en-US" sz="1800" b="1" dirty="0"/>
+            <a:endParaRPr lang="en-US" sz="1800" dirty="0"/>
           </a:p>
           <a:p>
             <a:pPr marL="342900" indent="-342900">
@@ -12290,15 +12361,20 @@
           </a:bodyPr>
           <a:lstStyle/>
           <a:p>
+            <a:pPr marL="0" indent="0">
+              <a:buNone/>
+            </a:pPr>
             <a:r>
               <a:rPr lang="en-US" sz="1800" b="1" dirty="0"/>
-              <a:t>Strengths</a:t>
+              <a:t>Strengths </a:t>
             </a:r>
             <a:r>
               <a:rPr lang="ja-JP" altLang="en-US" sz="1800" b="1" dirty="0">
                 <a:solidFill>
                   <a:srgbClr val="1F497D"/>
                 </a:solidFill>
+                <a:latin typeface="DengXian" panose="02010600030101010101" pitchFamily="2" charset="-122"/>
+                <a:ea typeface="DengXian" panose="02010600030101010101" pitchFamily="2" charset="-122"/>
               </a:rPr>
               <a:t>强项</a:t>
             </a:r>
@@ -12346,17 +12422,22 @@
             </a:endParaRPr>
           </a:p>
           <a:p>
+            <a:pPr marL="0" indent="0">
+              <a:buNone/>
+            </a:pPr>
             <a:r>
               <a:rPr lang="en-US" sz="1800" b="1" dirty="0"/>
-              <a:t>Weaknesses</a:t>
-            </a:r>
-            <a:r>
-              <a:rPr lang="ja-JP" altLang="en-US" sz="1800" b="1" dirty="0">
-                <a:solidFill>
-                  <a:srgbClr val="1F497D"/>
-                </a:solidFill>
-              </a:rPr>
-              <a:t>弱点</a:t>
+              <a:t>Weaknesses </a:t>
+            </a:r>
+            <a:r>
+              <a:rPr lang="zh-CN" altLang="en-US" sz="1800" dirty="0">
+                <a:solidFill>
+                  <a:srgbClr val="1F497D"/>
+                </a:solidFill>
+                <a:latin typeface="DengXian" panose="02010600030101010101" pitchFamily="2" charset="-122"/>
+                <a:ea typeface="DengXian" panose="02010600030101010101" pitchFamily="2" charset="-122"/>
+              </a:rPr>
+              <a:t>弱项</a:t>
             </a:r>
             <a:r>
               <a:rPr lang="en-US" altLang="ja-JP" sz="1800" b="1" dirty="0"/>
@@ -12641,15 +12722,20 @@
           </a:bodyPr>
           <a:lstStyle/>
           <a:p>
+            <a:pPr marL="0" indent="0">
+              <a:buNone/>
+            </a:pPr>
             <a:r>
               <a:rPr lang="en-US" sz="1800" b="1" dirty="0"/>
-              <a:t>Strengths</a:t>
+              <a:t>Strengths </a:t>
             </a:r>
             <a:r>
               <a:rPr lang="ja-JP" altLang="en-US" sz="1800" b="1" dirty="0">
                 <a:solidFill>
                   <a:srgbClr val="1F497D"/>
                 </a:solidFill>
+                <a:latin typeface="DengXian" panose="02010600030101010101" pitchFamily="2" charset="-122"/>
+                <a:ea typeface="DengXian" panose="02010600030101010101" pitchFamily="2" charset="-122"/>
               </a:rPr>
               <a:t>强项</a:t>
             </a:r>
@@ -12693,17 +12779,22 @@
             <a:endParaRPr lang="en-US" sz="1800" dirty="0"/>
           </a:p>
           <a:p>
+            <a:pPr marL="0" indent="0">
+              <a:buNone/>
+            </a:pPr>
             <a:r>
               <a:rPr lang="en-US" sz="1800" b="1" dirty="0"/>
-              <a:t>Weaknesses</a:t>
-            </a:r>
-            <a:r>
-              <a:rPr lang="ja-JP" altLang="en-US" sz="1800" b="1" dirty="0">
-                <a:solidFill>
-                  <a:srgbClr val="1F497D"/>
-                </a:solidFill>
-              </a:rPr>
-              <a:t>弱点</a:t>
+              <a:t>Weaknesses </a:t>
+            </a:r>
+            <a:r>
+              <a:rPr lang="zh-CN" altLang="en-US" sz="1800" dirty="0">
+                <a:solidFill>
+                  <a:srgbClr val="1F497D"/>
+                </a:solidFill>
+                <a:latin typeface="DengXian" panose="02010600030101010101" pitchFamily="2" charset="-122"/>
+                <a:ea typeface="DengXian" panose="02010600030101010101" pitchFamily="2" charset="-122"/>
+              </a:rPr>
+              <a:t>弱项</a:t>
             </a:r>
             <a:r>
               <a:rPr lang="en-US" altLang="ja-JP" sz="1800" b="1" dirty="0"/>
@@ -12857,15 +12948,7 @@
           <a:p>
             <a:r>
               <a:rPr lang="en-US" dirty="0"/>
-              <a:t>Requirements Development and Management (</a:t>
-            </a:r>
-            <a:r>
-              <a:rPr lang="en-US" dirty="0" err="1"/>
-              <a:t>RDM</a:t>
-            </a:r>
-            <a:r>
-              <a:rPr lang="en-US" dirty="0"/>
-              <a:t>)</a:t>
+              <a:t>Requirements Development and Management (RDM)</a:t>
             </a:r>
             <a:br>
               <a:rPr lang="en-US" dirty="0"/>
@@ -13003,15 +13086,20 @@
           </a:bodyPr>
           <a:lstStyle/>
           <a:p>
+            <a:pPr marL="0" indent="0">
+              <a:buNone/>
+            </a:pPr>
             <a:r>
               <a:rPr lang="en-US" sz="1800" b="1" dirty="0"/>
-              <a:t>Strengths</a:t>
+              <a:t>Strengths </a:t>
             </a:r>
             <a:r>
               <a:rPr lang="ja-JP" altLang="en-US" sz="1800" b="1" dirty="0">
                 <a:solidFill>
                   <a:srgbClr val="1F497D"/>
                 </a:solidFill>
+                <a:latin typeface="DengXian" panose="02010600030101010101" pitchFamily="2" charset="-122"/>
+                <a:ea typeface="DengXian" panose="02010600030101010101" pitchFamily="2" charset="-122"/>
               </a:rPr>
               <a:t>强项</a:t>
             </a:r>
@@ -13056,17 +13144,22 @@
             <a:endParaRPr lang="en-US" sz="1800" dirty="0"/>
           </a:p>
           <a:p>
+            <a:pPr marL="0" indent="0">
+              <a:buNone/>
+            </a:pPr>
             <a:r>
               <a:rPr lang="en-US" sz="1800" b="1" dirty="0"/>
-              <a:t>Weaknesses</a:t>
-            </a:r>
-            <a:r>
-              <a:rPr lang="ja-JP" altLang="en-US" sz="1800" b="1" dirty="0">
-                <a:solidFill>
-                  <a:srgbClr val="1F497D"/>
-                </a:solidFill>
-              </a:rPr>
-              <a:t>弱点</a:t>
+              <a:t>Weaknesses </a:t>
+            </a:r>
+            <a:r>
+              <a:rPr lang="zh-CN" altLang="en-US" sz="1800" dirty="0">
+                <a:solidFill>
+                  <a:srgbClr val="1F497D"/>
+                </a:solidFill>
+                <a:latin typeface="DengXian" panose="02010600030101010101" pitchFamily="2" charset="-122"/>
+                <a:ea typeface="DengXian" panose="02010600030101010101" pitchFamily="2" charset="-122"/>
+              </a:rPr>
+              <a:t>弱项</a:t>
             </a:r>
             <a:r>
               <a:rPr lang="en-US" altLang="ja-JP" sz="1800" b="1" dirty="0"/>
@@ -13174,12 +13267,18 @@
             </a:br>
             <a:r>
               <a:rPr lang="zh-CN" altLang="en-US" sz="6000" b="1" dirty="0">
+                <a:solidFill>
+                  <a:srgbClr val="1F497D"/>
+                </a:solidFill>
                 <a:latin typeface="+mn-ea"/>
                 <a:ea typeface="+mn-ea"/>
               </a:rPr>
               <a:t>评估概述</a:t>
             </a:r>
             <a:endParaRPr lang="en-US" b="1" dirty="0">
+              <a:solidFill>
+                <a:srgbClr val="1F497D"/>
+              </a:solidFill>
               <a:latin typeface="+mn-lt"/>
             </a:endParaRPr>
           </a:p>
@@ -13188,7 +13287,7 @@
     </p:spTree>
     <p:extLst>
       <p:ext uri="{BB962C8B-B14F-4D97-AF65-F5344CB8AC3E}">
-        <p14:creationId xmlns:p14="http://schemas.microsoft.com/office/powerpoint/2010/main" val="1570932285"/>
+        <p14:creationId xmlns:p14="http://schemas.microsoft.com/office/powerpoint/2010/main" val="3938322201"/>
       </p:ext>
     </p:extLst>
   </p:cSld>
@@ -13447,15 +13546,20 @@
           </a:bodyPr>
           <a:lstStyle/>
           <a:p>
+            <a:pPr marL="0" indent="0">
+              <a:buNone/>
+            </a:pPr>
             <a:r>
               <a:rPr lang="en-US" sz="1800" b="1" dirty="0"/>
-              <a:t>Strengths</a:t>
+              <a:t>Strengths </a:t>
             </a:r>
             <a:r>
               <a:rPr lang="ja-JP" altLang="en-US" sz="1800" b="1" dirty="0">
                 <a:solidFill>
                   <a:srgbClr val="1F497D"/>
                 </a:solidFill>
+                <a:latin typeface="DengXian" panose="02010600030101010101" pitchFamily="2" charset="-122"/>
+                <a:ea typeface="DengXian" panose="02010600030101010101" pitchFamily="2" charset="-122"/>
               </a:rPr>
               <a:t>强项</a:t>
             </a:r>
@@ -13492,17 +13596,22 @@
             <a:endParaRPr lang="en-US" sz="1800" dirty="0"/>
           </a:p>
           <a:p>
+            <a:pPr marL="0" indent="0">
+              <a:buNone/>
+            </a:pPr>
             <a:r>
               <a:rPr lang="en-US" sz="1800" b="1" dirty="0"/>
-              <a:t>Weaknesses</a:t>
-            </a:r>
-            <a:r>
-              <a:rPr lang="ja-JP" altLang="en-US" sz="1800" b="1" dirty="0">
-                <a:solidFill>
-                  <a:srgbClr val="1F497D"/>
-                </a:solidFill>
-              </a:rPr>
-              <a:t>弱点</a:t>
+              <a:t>Weaknesses </a:t>
+            </a:r>
+            <a:r>
+              <a:rPr lang="zh-CN" altLang="en-US" sz="1800" dirty="0">
+                <a:solidFill>
+                  <a:srgbClr val="1F497D"/>
+                </a:solidFill>
+                <a:latin typeface="DengXian" panose="02010600030101010101" pitchFamily="2" charset="-122"/>
+                <a:ea typeface="DengXian" panose="02010600030101010101" pitchFamily="2" charset="-122"/>
+              </a:rPr>
+              <a:t>弱项</a:t>
             </a:r>
             <a:r>
               <a:rPr lang="en-US" altLang="ja-JP" sz="1800" b="1" dirty="0"/>
@@ -13622,16 +13731,25 @@
           </a:bodyPr>
           <a:lstStyle/>
           <a:p>
-            <a:r>
-              <a:rPr lang="en-US" sz="1800" dirty="0"/>
-              <a:t>Strengths</a:t>
-            </a:r>
-            <a:r>
-              <a:rPr lang="ja-JP" altLang="en-US" sz="1800" dirty="0"/>
+            <a:pPr marL="0" indent="0">
+              <a:buNone/>
+            </a:pPr>
+            <a:r>
+              <a:rPr lang="en-US" sz="1800" b="1" dirty="0"/>
+              <a:t>Strengths </a:t>
+            </a:r>
+            <a:r>
+              <a:rPr lang="ja-JP" altLang="en-US" sz="1800" b="1" dirty="0">
+                <a:solidFill>
+                  <a:srgbClr val="1F497D"/>
+                </a:solidFill>
+                <a:latin typeface="DengXian" panose="02010600030101010101" pitchFamily="2" charset="-122"/>
+                <a:ea typeface="DengXian" panose="02010600030101010101" pitchFamily="2" charset="-122"/>
+              </a:rPr>
               <a:t>强项</a:t>
             </a:r>
             <a:r>
-              <a:rPr lang="en-US" altLang="ja-JP" sz="1800" dirty="0"/>
+              <a:rPr lang="en-US" altLang="ja-JP" sz="1800" b="1" dirty="0"/>
               <a:t>:</a:t>
             </a:r>
             <a:endParaRPr lang="en-US" sz="1800" dirty="0"/>
@@ -13670,20 +13788,25 @@
             <a:endParaRPr lang="en-US" sz="1800" dirty="0"/>
           </a:p>
           <a:p>
-            <a:r>
-              <a:rPr lang="en-US" sz="1800" dirty="0"/>
-              <a:t>Weaknesses</a:t>
-            </a:r>
-            <a:r>
-              <a:rPr lang="ja-JP" altLang="en-US" sz="1800" dirty="0">
-                <a:solidFill>
-                  <a:srgbClr val="1F497D"/>
-                </a:solidFill>
-              </a:rPr>
-              <a:t>弱点</a:t>
-            </a:r>
-            <a:r>
-              <a:rPr lang="en-US" altLang="ja-JP" sz="1800" dirty="0"/>
+            <a:pPr marL="0" indent="0">
+              <a:buNone/>
+            </a:pPr>
+            <a:r>
+              <a:rPr lang="en-US" sz="1800" b="1" dirty="0"/>
+              <a:t>Weaknesses </a:t>
+            </a:r>
+            <a:r>
+              <a:rPr lang="zh-CN" altLang="en-US" sz="1800" dirty="0">
+                <a:solidFill>
+                  <a:srgbClr val="1F497D"/>
+                </a:solidFill>
+                <a:latin typeface="DengXian" panose="02010600030101010101" pitchFamily="2" charset="-122"/>
+                <a:ea typeface="DengXian" panose="02010600030101010101" pitchFamily="2" charset="-122"/>
+              </a:rPr>
+              <a:t>弱项</a:t>
+            </a:r>
+            <a:r>
+              <a:rPr lang="en-US" altLang="ja-JP" sz="1800" b="1" dirty="0"/>
               <a:t>:</a:t>
             </a:r>
             <a:endParaRPr lang="en-US" sz="1800" dirty="0"/>
@@ -13962,24 +14085,28 @@
           </a:bodyPr>
           <a:lstStyle/>
           <a:p>
-            <a:r>
-              <a:rPr lang="en-US" sz="1800" dirty="0"/>
-              <a:t>Strengths</a:t>
-            </a:r>
-            <a:r>
-              <a:rPr lang="ja-JP" altLang="en-US" sz="1800" dirty="0">
-                <a:solidFill>
-                  <a:srgbClr val="1F497D"/>
-                </a:solidFill>
-                <a:latin typeface="宋体" panose="02010600030101010101" pitchFamily="2" charset="-122"/>
-                <a:ea typeface="宋体" panose="02010600030101010101" pitchFamily="2" charset="-122"/>
+            <a:pPr marL="0" indent="0">
+              <a:buNone/>
+            </a:pPr>
+            <a:r>
+              <a:rPr lang="en-US" sz="1800" b="1" dirty="0"/>
+              <a:t>Strengths </a:t>
+            </a:r>
+            <a:r>
+              <a:rPr lang="ja-JP" altLang="en-US" sz="1800" b="1" dirty="0">
+                <a:solidFill>
+                  <a:srgbClr val="1F497D"/>
+                </a:solidFill>
+                <a:latin typeface="DengXian" panose="02010600030101010101" pitchFamily="2" charset="-122"/>
+                <a:ea typeface="DengXian" panose="02010600030101010101" pitchFamily="2" charset="-122"/>
               </a:rPr>
               <a:t>强项</a:t>
             </a:r>
             <a:r>
-              <a:rPr lang="en-US" sz="1800" dirty="0"/>
+              <a:rPr lang="en-US" altLang="ja-JP" sz="1800" b="1" dirty="0"/>
               <a:t>:</a:t>
             </a:r>
+            <a:endParaRPr lang="en-US" sz="1800" dirty="0"/>
           </a:p>
           <a:p>
             <a:pPr marL="342900" indent="-342900">
@@ -15229,7 +15356,7 @@
         </p:blipFill>
         <p:spPr bwMode="auto">
           <a:xfrm>
-            <a:off x="7120058" y="1128559"/>
+            <a:off x="8521521" y="1137931"/>
             <a:ext cx="1231569" cy="718248"/>
           </a:xfrm>
           <a:prstGeom prst="rect">
@@ -15289,7 +15416,7 @@
         </p:blipFill>
         <p:spPr bwMode="auto">
           <a:xfrm>
-            <a:off x="8490820" y="1137931"/>
+            <a:off x="1577231" y="2015130"/>
             <a:ext cx="1268762" cy="714158"/>
           </a:xfrm>
           <a:prstGeom prst="rect">
@@ -15336,7 +15463,7 @@
         </p:blipFill>
         <p:spPr bwMode="auto">
           <a:xfrm>
-            <a:off x="2409394" y="1994893"/>
+            <a:off x="2940926" y="2012452"/>
             <a:ext cx="1264748" cy="718248"/>
           </a:xfrm>
           <a:prstGeom prst="rect">
@@ -15383,7 +15510,7 @@
         </p:blipFill>
         <p:spPr bwMode="auto">
           <a:xfrm>
-            <a:off x="6559671" y="2027939"/>
+            <a:off x="7103469" y="2064789"/>
             <a:ext cx="1264745" cy="692422"/>
           </a:xfrm>
           <a:prstGeom prst="rect">
@@ -15447,7 +15574,7 @@
         </p:blipFill>
         <p:spPr>
           <a:xfrm>
-            <a:off x="5706358" y="1120228"/>
+            <a:off x="7103469" y="1115118"/>
             <a:ext cx="1268762" cy="718248"/>
           </a:xfrm>
           <a:prstGeom prst="rect">
@@ -15566,7 +15693,7 @@
         </p:blipFill>
         <p:spPr>
           <a:xfrm>
-            <a:off x="7986718" y="2033186"/>
+            <a:off x="8514729" y="2061100"/>
             <a:ext cx="1233910" cy="681927"/>
           </a:xfrm>
           <a:prstGeom prst="rect">
@@ -15596,7 +15723,7 @@
         </p:blipFill>
         <p:spPr>
           <a:xfrm>
-            <a:off x="3794834" y="1994893"/>
+            <a:off x="4303652" y="1994893"/>
             <a:ext cx="1264745" cy="735807"/>
           </a:xfrm>
           <a:prstGeom prst="rect">
@@ -15633,8 +15760,55 @@
         </p:blipFill>
         <p:spPr bwMode="auto">
           <a:xfrm>
-            <a:off x="5180271" y="2013201"/>
+            <a:off x="5711385" y="2047657"/>
             <a:ext cx="1258708" cy="681631"/>
+          </a:xfrm>
+          <a:prstGeom prst="rect">
+            <a:avLst/>
+          </a:prstGeom>
+          <a:noFill/>
+          <a:extLst>
+            <a:ext uri="{909E8E84-426E-40DD-AFC4-6F175D3DCCD1}">
+              <a14:hiddenFill xmlns:a14="http://schemas.microsoft.com/office/drawing/2010/main">
+                <a:solidFill>
+                  <a:srgbClr val="FFFFFF"/>
+                </a:solidFill>
+              </a14:hiddenFill>
+            </a:ext>
+          </a:extLst>
+        </p:spPr>
+      </p:pic>
+      <p:pic>
+        <p:nvPicPr>
+          <p:cNvPr id="1026" name="Picture 2" descr="India - Wikipedia">
+            <a:extLst>
+              <a:ext uri="{FF2B5EF4-FFF2-40B4-BE49-F238E27FC236}">
+                <a16:creationId xmlns:a16="http://schemas.microsoft.com/office/drawing/2014/main" id="{240C6A43-575E-4561-B76F-E763EB0D668B}"/>
+              </a:ext>
+            </a:extLst>
+          </p:cNvPr>
+          <p:cNvPicPr>
+            <a:picLocks noChangeAspect="1" noChangeArrowheads="1"/>
+          </p:cNvPicPr>
+          <p:nvPr/>
+        </p:nvPicPr>
+        <p:blipFill>
+          <a:blip r:embed="rId26">
+            <a:extLst>
+              <a:ext uri="{28A0092B-C50C-407E-A947-70E740481C1C}">
+                <a14:useLocalDpi xmlns:a14="http://schemas.microsoft.com/office/drawing/2010/main" val="0"/>
+              </a:ext>
+            </a:extLst>
+          </a:blip>
+          <a:srcRect/>
+          <a:stretch>
+            <a:fillRect/>
+          </a:stretch>
+        </p:blipFill>
+        <p:spPr bwMode="auto">
+          <a:xfrm>
+            <a:off x="5700720" y="1138129"/>
+            <a:ext cx="1233910" cy="703097"/>
           </a:xfrm>
           <a:prstGeom prst="rect">
             <a:avLst/>
@@ -18004,18 +18178,18 @@
 </file>
 
 <file path=customXml/item1.xml><?xml version="1.0" encoding="utf-8"?>
+<p:properties xmlns:p="http://schemas.microsoft.com/office/2006/metadata/properties" xmlns:xsi="http://www.w3.org/2001/XMLSchema-instance" xmlns:pc="http://schemas.microsoft.com/office/infopath/2007/PartnerControls">
+  <documentManagement/>
+</p:properties>
+</file>
+
+<file path=customXml/item2.xml><?xml version="1.0" encoding="utf-8"?>
 <?mso-contentType ?>
 <FormTemplates xmlns="http://schemas.microsoft.com/sharepoint/v3/contenttype/forms">
   <Display>DocumentLibraryForm</Display>
   <Edit>DocumentLibraryForm</Edit>
   <New>DocumentLibraryForm</New>
 </FormTemplates>
-</file>
-
-<file path=customXml/item2.xml><?xml version="1.0" encoding="utf-8"?>
-<p:properties xmlns:p="http://schemas.microsoft.com/office/2006/metadata/properties" xmlns:xsi="http://www.w3.org/2001/XMLSchema-instance" xmlns:pc="http://schemas.microsoft.com/office/infopath/2007/PartnerControls">
-  <documentManagement/>
-</p:properties>
 </file>
 
 <file path=customXml/item3.xml><?xml version="1.0" encoding="utf-8"?>
@@ -18230,14 +18404,6 @@
 </file>
 
 <file path=customXml/itemProps1.xml><?xml version="1.0" encoding="utf-8"?>
-<ds:datastoreItem xmlns:ds="http://schemas.openxmlformats.org/officeDocument/2006/customXml" ds:itemID="{B8B49826-D5EE-4D24-B649-7C3A19B527D2}">
-  <ds:schemaRefs>
-    <ds:schemaRef ds:uri="http://schemas.microsoft.com/sharepoint/v3/contenttype/forms"/>
-  </ds:schemaRefs>
-</ds:datastoreItem>
-</file>
-
-<file path=customXml/itemProps2.xml><?xml version="1.0" encoding="utf-8"?>
 <ds:datastoreItem xmlns:ds="http://schemas.openxmlformats.org/officeDocument/2006/customXml" ds:itemID="{5F07B0D7-F930-4230-933E-ABA84959494E}">
   <ds:schemaRefs>
     <ds:schemaRef ds:uri="http://purl.org/dc/terms/"/>
@@ -18248,6 +18414,14 @@
     <ds:schemaRef ds:uri="http://schemas.openxmlformats.org/package/2006/metadata/core-properties"/>
     <ds:schemaRef ds:uri="http://schemas.microsoft.com/office/2006/metadata/properties"/>
     <ds:schemaRef ds:uri="http://purl.org/dc/elements/1.1/"/>
+  </ds:schemaRefs>
+</ds:datastoreItem>
+</file>
+
+<file path=customXml/itemProps2.xml><?xml version="1.0" encoding="utf-8"?>
+<ds:datastoreItem xmlns:ds="http://schemas.openxmlformats.org/officeDocument/2006/customXml" ds:itemID="{B8B49826-D5EE-4D24-B649-7C3A19B527D2}">
+  <ds:schemaRefs>
+    <ds:schemaRef ds:uri="http://schemas.microsoft.com/sharepoint/v3/contenttype/forms"/>
   </ds:schemaRefs>
 </ds:datastoreItem>
 </file>

</xml_diff>